<commit_message>
map and producer updates
</commit_message>
<xml_diff>
--- a/v3/assets/wiki-assets/Map.pptx
+++ b/v3/assets/wiki-assets/Map.pptx
@@ -3709,7 +3709,7 @@
           <p:nvPr>
             <p:extLst>
               <p:ext uri="{D42A27DB-BD31-4B8C-83A1-F6EECF244321}">
-                <p14:modId xmlns:p14="http://schemas.microsoft.com/office/powerpoint/2010/main" val="371652604"/>
+                <p14:modId xmlns:p14="http://schemas.microsoft.com/office/powerpoint/2010/main" val="2185398590"/>
               </p:ext>
             </p:extLst>
           </p:nvPr>
@@ -13037,23 +13037,10 @@
                     <a:lstStyle/>
                     <a:p>
                       <a:pPr algn="ctr"/>
-                      <a:r>
-                        <a:rPr lang="en-US" sz="800" dirty="0">
-                          <a:latin typeface="3270-MEDIUM" panose="02000609000000000000" pitchFamily="49" charset="77"/>
-                          <a:ea typeface="3270-MEDIUM" panose="02000609000000000000" pitchFamily="49" charset="77"/>
-                        </a:rPr>
-                        <a:t>Lumber Mill</a:t>
-                      </a:r>
-                    </a:p>
-                    <a:p>
-                      <a:pPr algn="ctr"/>
-                      <a:r>
-                        <a:rPr lang="en-US" sz="800" dirty="0">
-                          <a:latin typeface="3270-MEDIUM" panose="02000609000000000000" pitchFamily="49" charset="77"/>
-                          <a:ea typeface="3270-MEDIUM" panose="02000609000000000000" pitchFamily="49" charset="77"/>
-                        </a:rPr>
-                        <a:t>0</a:t>
-                      </a:r>
+                      <a:endParaRPr lang="en-US" sz="800" dirty="0">
+                        <a:latin typeface="3270-MEDIUM" panose="02000609000000000000" pitchFamily="49" charset="77"/>
+                        <a:ea typeface="3270-MEDIUM" panose="02000609000000000000" pitchFamily="49" charset="77"/>
+                      </a:endParaRPr>
                     </a:p>
                   </a:txBody>
                   <a:tcPr anchor="ctr">
@@ -14845,10 +14832,23 @@
                     <a:lstStyle/>
                     <a:p>
                       <a:pPr algn="ctr"/>
-                      <a:endParaRPr lang="en-US" sz="800">
-                        <a:latin typeface="3270-MEDIUM" panose="02000609000000000000" pitchFamily="49" charset="77"/>
-                        <a:ea typeface="3270-MEDIUM" panose="02000609000000000000" pitchFamily="49" charset="77"/>
-                      </a:endParaRPr>
+                      <a:r>
+                        <a:rPr lang="en-US" sz="800" dirty="0">
+                          <a:latin typeface="3270-MEDIUM" panose="02000609000000000000" pitchFamily="49" charset="77"/>
+                          <a:ea typeface="3270-MEDIUM" panose="02000609000000000000" pitchFamily="49" charset="77"/>
+                        </a:rPr>
+                        <a:t>Lumber Mill</a:t>
+                      </a:r>
+                    </a:p>
+                    <a:p>
+                      <a:pPr algn="ctr"/>
+                      <a:r>
+                        <a:rPr lang="en-US" sz="800" dirty="0">
+                          <a:latin typeface="3270-MEDIUM" panose="02000609000000000000" pitchFamily="49" charset="77"/>
+                          <a:ea typeface="3270-MEDIUM" panose="02000609000000000000" pitchFamily="49" charset="77"/>
+                        </a:rPr>
+                        <a:t>0</a:t>
+                      </a:r>
                     </a:p>
                   </a:txBody>
                   <a:tcPr anchor="ctr">
@@ -15050,7 +15050,7 @@
           <p:nvPr>
             <p:extLst>
               <p:ext uri="{D42A27DB-BD31-4B8C-83A1-F6EECF244321}">
-                <p14:modId xmlns:p14="http://schemas.microsoft.com/office/powerpoint/2010/main" val="2568890260"/>
+                <p14:modId xmlns:p14="http://schemas.microsoft.com/office/powerpoint/2010/main" val="559875247"/>
               </p:ext>
             </p:extLst>
           </p:nvPr>
@@ -16461,7 +16461,7 @@
                           <a:ea typeface="Liberation Sans" panose="020B0604020202020204" pitchFamily="34" charset="0"/>
                           <a:cs typeface="Liberation Sans" panose="020B0604020202020204" pitchFamily="34" charset="0"/>
                         </a:rPr>
-                        <a:t>P</a:t>
+                        <a:t>H</a:t>
                       </a:r>
                     </a:p>
                   </a:txBody>
@@ -20839,7 +20839,7 @@
                           <a:ea typeface="Liberation Sans" panose="020B0604020202020204" pitchFamily="34" charset="0"/>
                           <a:cs typeface="Liberation Sans" panose="020B0604020202020204" pitchFamily="34" charset="0"/>
                         </a:rPr>
-                        <a:t>7</a:t>
+                        <a:t>9</a:t>
                       </a:r>
                     </a:p>
                   </a:txBody>
@@ -20905,7 +20905,7 @@
                           <a:ea typeface="Liberation Sans" panose="020B0604020202020204" pitchFamily="34" charset="0"/>
                           <a:cs typeface="Liberation Sans" panose="020B0604020202020204" pitchFamily="34" charset="0"/>
                         </a:rPr>
-                        <a:t>9</a:t>
+                        <a:t>11</a:t>
                       </a:r>
                     </a:p>
                   </a:txBody>
@@ -22454,21 +22454,6 @@
 </file>
 
 <file path=customXml/item1.xml><?xml version="1.0" encoding="utf-8"?>
-<?mso-contentType ?>
-<FormTemplates xmlns="http://schemas.microsoft.com/sharepoint/v3/contenttype/forms">
-  <Display>DocumentLibraryForm</Display>
-  <Edit>DocumentLibraryForm</Edit>
-  <New>DocumentLibraryForm</New>
-</FormTemplates>
-</file>
-
-<file path=customXml/item2.xml><?xml version="1.0" encoding="utf-8"?>
-<p:properties xmlns:p="http://schemas.microsoft.com/office/2006/metadata/properties" xmlns:xsi="http://www.w3.org/2001/XMLSchema-instance" xmlns:pc="http://schemas.microsoft.com/office/infopath/2007/PartnerControls">
-  <documentManagement/>
-</p:properties>
-</file>
-
-<file path=customXml/item3.xml><?xml version="1.0" encoding="utf-8"?>
 <ct:contentTypeSchema xmlns:ct="http://schemas.microsoft.com/office/2006/metadata/contentType" xmlns:ma="http://schemas.microsoft.com/office/2006/metadata/properties/metaAttributes" ct:_="" ma:_="" ma:contentTypeName="Document" ma:contentTypeID="0x0101009EFD646B4F1F2941BFE87072A31DF7CF" ma:contentTypeVersion="13" ma:contentTypeDescription="Create a new document." ma:contentTypeScope="" ma:versionID="2a4ed7486926686d12d961dc35adb93e">
   <xsd:schema xmlns:xsd="http://www.w3.org/2001/XMLSchema" xmlns:xs="http://www.w3.org/2001/XMLSchema" xmlns:p="http://schemas.microsoft.com/office/2006/metadata/properties" xmlns:ns3="1ba648b2-ed19-406a-aaa4-20fcd3e2fab1" xmlns:ns4="5338a460-e029-42e5-b663-835cf590d702" targetNamespace="http://schemas.microsoft.com/office/2006/metadata/properties" ma:root="true" ma:fieldsID="04499dfe8902becef02a577c2521a66a" ns3:_="" ns4:_="">
     <xsd:import namespace="1ba648b2-ed19-406a-aaa4-20fcd3e2fab1"/>
@@ -22691,10 +22676,36 @@
 </ct:contentTypeSchema>
 </file>
 
+<file path=customXml/item2.xml><?xml version="1.0" encoding="utf-8"?>
+<p:properties xmlns:p="http://schemas.microsoft.com/office/2006/metadata/properties" xmlns:xsi="http://www.w3.org/2001/XMLSchema-instance" xmlns:pc="http://schemas.microsoft.com/office/infopath/2007/PartnerControls">
+  <documentManagement/>
+</p:properties>
+</file>
+
+<file path=customXml/item3.xml><?xml version="1.0" encoding="utf-8"?>
+<?mso-contentType ?>
+<FormTemplates xmlns="http://schemas.microsoft.com/sharepoint/v3/contenttype/forms">
+  <Display>DocumentLibraryForm</Display>
+  <Edit>DocumentLibraryForm</Edit>
+  <New>DocumentLibraryForm</New>
+</FormTemplates>
+</file>
+
 <file path=customXml/itemProps1.xml><?xml version="1.0" encoding="utf-8"?>
-<ds:datastoreItem xmlns:ds="http://schemas.openxmlformats.org/officeDocument/2006/customXml" ds:itemID="{170A35C0-7EA7-46DE-9479-911CC97A43B0}">
+<ds:datastoreItem xmlns:ds="http://schemas.openxmlformats.org/officeDocument/2006/customXml" ds:itemID="{0C09A33E-D161-4005-8B3A-4D119472326C}">
   <ds:schemaRefs>
-    <ds:schemaRef ds:uri="http://schemas.microsoft.com/sharepoint/v3/contenttype/forms"/>
+    <ds:schemaRef ds:uri="http://schemas.microsoft.com/office/2006/metadata/contentType"/>
+    <ds:schemaRef ds:uri="http://schemas.microsoft.com/office/2006/metadata/properties/metaAttributes"/>
+    <ds:schemaRef ds:uri="http://www.w3.org/2001/XMLSchema"/>
+    <ds:schemaRef ds:uri="http://schemas.microsoft.com/office/2006/metadata/properties"/>
+    <ds:schemaRef ds:uri="1ba648b2-ed19-406a-aaa4-20fcd3e2fab1"/>
+    <ds:schemaRef ds:uri="5338a460-e029-42e5-b663-835cf590d702"/>
+    <ds:schemaRef ds:uri="http://schemas.microsoft.com/office/2006/documentManagement/types"/>
+    <ds:schemaRef ds:uri="http://schemas.microsoft.com/office/infopath/2007/PartnerControls"/>
+    <ds:schemaRef ds:uri="http://schemas.openxmlformats.org/package/2006/metadata/core-properties"/>
+    <ds:schemaRef ds:uri="http://purl.org/dc/elements/1.1/"/>
+    <ds:schemaRef ds:uri="http://purl.org/dc/terms/"/>
+    <ds:schemaRef ds:uri="http://schemas.microsoft.com/internal/obd"/>
   </ds:schemaRefs>
 </ds:datastoreItem>
 </file>
@@ -22717,20 +22728,9 @@
 </file>
 
 <file path=customXml/itemProps3.xml><?xml version="1.0" encoding="utf-8"?>
-<ds:datastoreItem xmlns:ds="http://schemas.openxmlformats.org/officeDocument/2006/customXml" ds:itemID="{0C09A33E-D161-4005-8B3A-4D119472326C}">
+<ds:datastoreItem xmlns:ds="http://schemas.openxmlformats.org/officeDocument/2006/customXml" ds:itemID="{170A35C0-7EA7-46DE-9479-911CC97A43B0}">
   <ds:schemaRefs>
-    <ds:schemaRef ds:uri="http://schemas.microsoft.com/office/2006/metadata/contentType"/>
-    <ds:schemaRef ds:uri="http://schemas.microsoft.com/office/2006/metadata/properties/metaAttributes"/>
-    <ds:schemaRef ds:uri="http://www.w3.org/2001/XMLSchema"/>
-    <ds:schemaRef ds:uri="http://schemas.microsoft.com/office/2006/metadata/properties"/>
-    <ds:schemaRef ds:uri="1ba648b2-ed19-406a-aaa4-20fcd3e2fab1"/>
-    <ds:schemaRef ds:uri="5338a460-e029-42e5-b663-835cf590d702"/>
-    <ds:schemaRef ds:uri="http://schemas.microsoft.com/office/2006/documentManagement/types"/>
-    <ds:schemaRef ds:uri="http://schemas.microsoft.com/office/infopath/2007/PartnerControls"/>
-    <ds:schemaRef ds:uri="http://schemas.openxmlformats.org/package/2006/metadata/core-properties"/>
-    <ds:schemaRef ds:uri="http://purl.org/dc/elements/1.1/"/>
-    <ds:schemaRef ds:uri="http://purl.org/dc/terms/"/>
-    <ds:schemaRef ds:uri="http://schemas.microsoft.com/internal/obd"/>
+    <ds:schemaRef ds:uri="http://schemas.microsoft.com/sharepoint/v3/contenttype/forms"/>
   </ds:schemaRefs>
 </ds:datastoreItem>
 </file>
</xml_diff>